<commit_message>
made the two current methods agree
</commit_message>
<xml_diff>
--- a/fields.pptx
+++ b/fields.pptx
@@ -7,6 +7,7 @@
   <p:sldIdLst>
     <p:sldId id="256" r:id="rId2"/>
     <p:sldId id="257" r:id="rId3"/>
+    <p:sldId id="258" r:id="rId4"/>
   </p:sldIdLst>
   <p:sldSz cx="12192000" cy="6858000"/>
   <p:notesSz cx="6858000" cy="9144000"/>
@@ -105,6 +106,11 @@
       </a:defRPr>
     </a:lvl9pPr>
   </p:defaultTextStyle>
+  <p:extLst>
+    <p:ext uri="{EFAFB233-063F-42B5-8137-9DF3F51BA10A}">
+      <p15:sldGuideLst xmlns:p15="http://schemas.microsoft.com/office/powerpoint/2012/main"/>
+    </p:ext>
+  </p:extLst>
 </p:presentation>
 </file>
 
@@ -255,7 +261,7 @@
           <a:p>
             <a:fld id="{C461A754-F56A-4905-A4F5-79BFAE6BE676}" type="datetimeFigureOut">
               <a:rPr lang="en-US" smtClean="0"/>
-              <a:t>8/31/2023</a:t>
+              <a:t>9/1/2023</a:t>
             </a:fld>
             <a:endParaRPr lang="en-US"/>
           </a:p>
@@ -453,7 +459,7 @@
           <a:p>
             <a:fld id="{C461A754-F56A-4905-A4F5-79BFAE6BE676}" type="datetimeFigureOut">
               <a:rPr lang="en-US" smtClean="0"/>
-              <a:t>8/31/2023</a:t>
+              <a:t>9/1/2023</a:t>
             </a:fld>
             <a:endParaRPr lang="en-US"/>
           </a:p>
@@ -661,7 +667,7 @@
           <a:p>
             <a:fld id="{C461A754-F56A-4905-A4F5-79BFAE6BE676}" type="datetimeFigureOut">
               <a:rPr lang="en-US" smtClean="0"/>
-              <a:t>8/31/2023</a:t>
+              <a:t>9/1/2023</a:t>
             </a:fld>
             <a:endParaRPr lang="en-US"/>
           </a:p>
@@ -859,7 +865,7 @@
           <a:p>
             <a:fld id="{C461A754-F56A-4905-A4F5-79BFAE6BE676}" type="datetimeFigureOut">
               <a:rPr lang="en-US" smtClean="0"/>
-              <a:t>8/31/2023</a:t>
+              <a:t>9/1/2023</a:t>
             </a:fld>
             <a:endParaRPr lang="en-US"/>
           </a:p>
@@ -1134,7 +1140,7 @@
           <a:p>
             <a:fld id="{C461A754-F56A-4905-A4F5-79BFAE6BE676}" type="datetimeFigureOut">
               <a:rPr lang="en-US" smtClean="0"/>
-              <a:t>8/31/2023</a:t>
+              <a:t>9/1/2023</a:t>
             </a:fld>
             <a:endParaRPr lang="en-US"/>
           </a:p>
@@ -1399,7 +1405,7 @@
           <a:p>
             <a:fld id="{C461A754-F56A-4905-A4F5-79BFAE6BE676}" type="datetimeFigureOut">
               <a:rPr lang="en-US" smtClean="0"/>
-              <a:t>8/31/2023</a:t>
+              <a:t>9/1/2023</a:t>
             </a:fld>
             <a:endParaRPr lang="en-US"/>
           </a:p>
@@ -1811,7 +1817,7 @@
           <a:p>
             <a:fld id="{C461A754-F56A-4905-A4F5-79BFAE6BE676}" type="datetimeFigureOut">
               <a:rPr lang="en-US" smtClean="0"/>
-              <a:t>8/31/2023</a:t>
+              <a:t>9/1/2023</a:t>
             </a:fld>
             <a:endParaRPr lang="en-US"/>
           </a:p>
@@ -1952,7 +1958,7 @@
           <a:p>
             <a:fld id="{C461A754-F56A-4905-A4F5-79BFAE6BE676}" type="datetimeFigureOut">
               <a:rPr lang="en-US" smtClean="0"/>
-              <a:t>8/31/2023</a:t>
+              <a:t>9/1/2023</a:t>
             </a:fld>
             <a:endParaRPr lang="en-US"/>
           </a:p>
@@ -2065,7 +2071,7 @@
           <a:p>
             <a:fld id="{C461A754-F56A-4905-A4F5-79BFAE6BE676}" type="datetimeFigureOut">
               <a:rPr lang="en-US" smtClean="0"/>
-              <a:t>8/31/2023</a:t>
+              <a:t>9/1/2023</a:t>
             </a:fld>
             <a:endParaRPr lang="en-US"/>
           </a:p>
@@ -2376,7 +2382,7 @@
           <a:p>
             <a:fld id="{C461A754-F56A-4905-A4F5-79BFAE6BE676}" type="datetimeFigureOut">
               <a:rPr lang="en-US" smtClean="0"/>
-              <a:t>8/31/2023</a:t>
+              <a:t>9/1/2023</a:t>
             </a:fld>
             <a:endParaRPr lang="en-US"/>
           </a:p>
@@ -2664,7 +2670,7 @@
           <a:p>
             <a:fld id="{C461A754-F56A-4905-A4F5-79BFAE6BE676}" type="datetimeFigureOut">
               <a:rPr lang="en-US" smtClean="0"/>
-              <a:t>8/31/2023</a:t>
+              <a:t>9/1/2023</a:t>
             </a:fld>
             <a:endParaRPr lang="en-US"/>
           </a:p>
@@ -2905,7 +2911,7 @@
           <a:p>
             <a:fld id="{C461A754-F56A-4905-A4F5-79BFAE6BE676}" type="datetimeFigureOut">
               <a:rPr lang="en-US" smtClean="0"/>
-              <a:t>8/31/2023</a:t>
+              <a:t>9/1/2023</a:t>
             </a:fld>
             <a:endParaRPr lang="en-US"/>
           </a:p>
@@ -3865,6 +3871,286 @@
 </p:sld>
 </file>
 
+<file path=ppt/slides/slide3.xml><?xml version="1.0" encoding="utf-8"?>
+<p:sld xmlns:a="http://schemas.openxmlformats.org/drawingml/2006/main" xmlns:r="http://schemas.openxmlformats.org/officeDocument/2006/relationships" xmlns:p="http://schemas.openxmlformats.org/presentationml/2006/main">
+  <p:cSld>
+    <p:spTree>
+      <p:nvGrpSpPr>
+        <p:cNvPr id="1" name=""/>
+        <p:cNvGrpSpPr/>
+        <p:nvPr/>
+      </p:nvGrpSpPr>
+      <p:grpSpPr>
+        <a:xfrm>
+          <a:off x="0" y="0"/>
+          <a:ext cx="0" cy="0"/>
+          <a:chOff x="0" y="0"/>
+          <a:chExt cx="0" cy="0"/>
+        </a:xfrm>
+      </p:grpSpPr>
+      <p:sp>
+        <p:nvSpPr>
+          <p:cNvPr id="21" name="TextBox 20">
+            <a:extLst>
+              <a:ext uri="{FF2B5EF4-FFF2-40B4-BE49-F238E27FC236}">
+                <a16:creationId xmlns:a16="http://schemas.microsoft.com/office/drawing/2014/main" id="{F1B20DB2-E547-3710-4DDF-19988DE584B8}"/>
+              </a:ext>
+            </a:extLst>
+          </p:cNvPr>
+          <p:cNvSpPr txBox="1"/>
+          <p:nvPr/>
+        </p:nvSpPr>
+        <p:spPr>
+          <a:xfrm>
+            <a:off x="131171" y="5492027"/>
+            <a:ext cx="1960094" cy="646331"/>
+          </a:xfrm>
+          <a:prstGeom prst="rect">
+            <a:avLst/>
+          </a:prstGeom>
+          <a:noFill/>
+        </p:spPr>
+        <p:txBody>
+          <a:bodyPr wrap="square" rtlCol="0">
+            <a:spAutoFit/>
+          </a:bodyPr>
+          <a:lstStyle/>
+          <a:p>
+            <a:r>
+              <a:rPr lang="en-US" b="1" dirty="0"/>
+              <a:t>Mode reconstruction</a:t>
+            </a:r>
+          </a:p>
+        </p:txBody>
+      </p:sp>
+      <p:sp>
+        <p:nvSpPr>
+          <p:cNvPr id="20" name="TextBox 19">
+            <a:extLst>
+              <a:ext uri="{FF2B5EF4-FFF2-40B4-BE49-F238E27FC236}">
+                <a16:creationId xmlns:a16="http://schemas.microsoft.com/office/drawing/2014/main" id="{D15D3948-07FA-A5A7-A8CD-ED439DA27227}"/>
+              </a:ext>
+            </a:extLst>
+          </p:cNvPr>
+          <p:cNvSpPr txBox="1"/>
+          <p:nvPr/>
+        </p:nvSpPr>
+        <p:spPr>
+          <a:xfrm>
+            <a:off x="131171" y="59893"/>
+            <a:ext cx="1304926" cy="646331"/>
+          </a:xfrm>
+          <a:prstGeom prst="rect">
+            <a:avLst/>
+          </a:prstGeom>
+          <a:noFill/>
+        </p:spPr>
+        <p:txBody>
+          <a:bodyPr wrap="square" rtlCol="0">
+            <a:spAutoFit/>
+          </a:bodyPr>
+          <a:lstStyle/>
+          <a:p>
+            <a:r>
+              <a:rPr lang="en-US" b="1" dirty="0"/>
+              <a:t>Finite Difference</a:t>
+            </a:r>
+          </a:p>
+        </p:txBody>
+      </p:sp>
+      <p:pic>
+        <p:nvPicPr>
+          <p:cNvPr id="4" name="Picture 3">
+            <a:extLst>
+              <a:ext uri="{FF2B5EF4-FFF2-40B4-BE49-F238E27FC236}">
+                <a16:creationId xmlns:a16="http://schemas.microsoft.com/office/drawing/2014/main" id="{661865C1-B947-A826-1BA7-685D18102F9B}"/>
+              </a:ext>
+            </a:extLst>
+          </p:cNvPr>
+          <p:cNvPicPr>
+            <a:picLocks noChangeAspect="1"/>
+          </p:cNvPicPr>
+          <p:nvPr/>
+        </p:nvPicPr>
+        <p:blipFill>
+          <a:blip r:embed="rId2"/>
+          <a:stretch>
+            <a:fillRect/>
+          </a:stretch>
+        </p:blipFill>
+        <p:spPr>
+          <a:xfrm>
+            <a:off x="1309687" y="719642"/>
+            <a:ext cx="3259759" cy="2404558"/>
+          </a:xfrm>
+          <a:prstGeom prst="rect">
+            <a:avLst/>
+          </a:prstGeom>
+        </p:spPr>
+      </p:pic>
+      <p:pic>
+        <p:nvPicPr>
+          <p:cNvPr id="7" name="Picture 6">
+            <a:extLst>
+              <a:ext uri="{FF2B5EF4-FFF2-40B4-BE49-F238E27FC236}">
+                <a16:creationId xmlns:a16="http://schemas.microsoft.com/office/drawing/2014/main" id="{09DF777B-A3E0-4CC9-42DF-BA0D49AECD64}"/>
+              </a:ext>
+            </a:extLst>
+          </p:cNvPr>
+          <p:cNvPicPr>
+            <a:picLocks noChangeAspect="1"/>
+          </p:cNvPicPr>
+          <p:nvPr/>
+        </p:nvPicPr>
+        <p:blipFill>
+          <a:blip r:embed="rId3"/>
+          <a:stretch>
+            <a:fillRect/>
+          </a:stretch>
+        </p:blipFill>
+        <p:spPr>
+          <a:xfrm>
+            <a:off x="5014913" y="734799"/>
+            <a:ext cx="3304186" cy="2404559"/>
+          </a:xfrm>
+          <a:prstGeom prst="rect">
+            <a:avLst/>
+          </a:prstGeom>
+        </p:spPr>
+      </p:pic>
+      <p:pic>
+        <p:nvPicPr>
+          <p:cNvPr id="9" name="Picture 8">
+            <a:extLst>
+              <a:ext uri="{FF2B5EF4-FFF2-40B4-BE49-F238E27FC236}">
+                <a16:creationId xmlns:a16="http://schemas.microsoft.com/office/drawing/2014/main" id="{C8A094B3-AC26-1348-841F-9597AE0E0407}"/>
+              </a:ext>
+            </a:extLst>
+          </p:cNvPr>
+          <p:cNvPicPr>
+            <a:picLocks noChangeAspect="1"/>
+          </p:cNvPicPr>
+          <p:nvPr/>
+        </p:nvPicPr>
+        <p:blipFill>
+          <a:blip r:embed="rId4"/>
+          <a:stretch>
+            <a:fillRect/>
+          </a:stretch>
+        </p:blipFill>
+        <p:spPr>
+          <a:xfrm>
+            <a:off x="8662988" y="734800"/>
+            <a:ext cx="3182014" cy="2404558"/>
+          </a:xfrm>
+          <a:prstGeom prst="rect">
+            <a:avLst/>
+          </a:prstGeom>
+        </p:spPr>
+      </p:pic>
+      <p:pic>
+        <p:nvPicPr>
+          <p:cNvPr id="23" name="Picture 22">
+            <a:extLst>
+              <a:ext uri="{FF2B5EF4-FFF2-40B4-BE49-F238E27FC236}">
+                <a16:creationId xmlns:a16="http://schemas.microsoft.com/office/drawing/2014/main" id="{1AC0191A-2307-B9CB-651E-32FC1F47B12D}"/>
+              </a:ext>
+            </a:extLst>
+          </p:cNvPr>
+          <p:cNvPicPr>
+            <a:picLocks noChangeAspect="1"/>
+          </p:cNvPicPr>
+          <p:nvPr/>
+        </p:nvPicPr>
+        <p:blipFill>
+          <a:blip r:embed="rId5"/>
+          <a:stretch>
+            <a:fillRect/>
+          </a:stretch>
+        </p:blipFill>
+        <p:spPr>
+          <a:xfrm>
+            <a:off x="1309686" y="3233737"/>
+            <a:ext cx="3259760" cy="2404559"/>
+          </a:xfrm>
+          <a:prstGeom prst="rect">
+            <a:avLst/>
+          </a:prstGeom>
+        </p:spPr>
+      </p:pic>
+      <p:pic>
+        <p:nvPicPr>
+          <p:cNvPr id="25" name="Picture 24">
+            <a:extLst>
+              <a:ext uri="{FF2B5EF4-FFF2-40B4-BE49-F238E27FC236}">
+                <a16:creationId xmlns:a16="http://schemas.microsoft.com/office/drawing/2014/main" id="{DF61FDD5-0150-0DF2-BE73-A5B4498FE571}"/>
+              </a:ext>
+            </a:extLst>
+          </p:cNvPr>
+          <p:cNvPicPr>
+            <a:picLocks noChangeAspect="1"/>
+          </p:cNvPicPr>
+          <p:nvPr/>
+        </p:nvPicPr>
+        <p:blipFill>
+          <a:blip r:embed="rId6"/>
+          <a:stretch>
+            <a:fillRect/>
+          </a:stretch>
+        </p:blipFill>
+        <p:spPr>
+          <a:xfrm>
+            <a:off x="5014913" y="3233737"/>
+            <a:ext cx="3304185" cy="2404558"/>
+          </a:xfrm>
+          <a:prstGeom prst="rect">
+            <a:avLst/>
+          </a:prstGeom>
+        </p:spPr>
+      </p:pic>
+      <p:pic>
+        <p:nvPicPr>
+          <p:cNvPr id="27" name="Picture 26">
+            <a:extLst>
+              <a:ext uri="{FF2B5EF4-FFF2-40B4-BE49-F238E27FC236}">
+                <a16:creationId xmlns:a16="http://schemas.microsoft.com/office/drawing/2014/main" id="{73ABCFC9-CBB5-9487-7738-2A31F1E713AA}"/>
+              </a:ext>
+            </a:extLst>
+          </p:cNvPr>
+          <p:cNvPicPr>
+            <a:picLocks noChangeAspect="1"/>
+          </p:cNvPicPr>
+          <p:nvPr/>
+        </p:nvPicPr>
+        <p:blipFill>
+          <a:blip r:embed="rId7"/>
+          <a:stretch>
+            <a:fillRect/>
+          </a:stretch>
+        </p:blipFill>
+        <p:spPr>
+          <a:xfrm>
+            <a:off x="8662988" y="3372263"/>
+            <a:ext cx="3182014" cy="2442929"/>
+          </a:xfrm>
+          <a:prstGeom prst="rect">
+            <a:avLst/>
+          </a:prstGeom>
+        </p:spPr>
+      </p:pic>
+    </p:spTree>
+    <p:extLst>
+      <p:ext uri="{BB962C8B-B14F-4D97-AF65-F5344CB8AC3E}">
+        <p14:creationId xmlns:p14="http://schemas.microsoft.com/office/powerpoint/2010/main" val="4064582253"/>
+      </p:ext>
+    </p:extLst>
+  </p:cSld>
+  <p:clrMapOvr>
+    <a:masterClrMapping/>
+  </p:clrMapOvr>
+</p:sld>
+</file>
+
 <file path=ppt/theme/theme1.xml><?xml version="1.0" encoding="utf-8"?>
 <a:theme xmlns:a="http://schemas.openxmlformats.org/drawingml/2006/main" name="Office Theme">
   <a:themeElements>

</xml_diff>

<commit_message>
fixed order of plots
</commit_message>
<xml_diff>
--- a/fields.pptx
+++ b/fields.pptx
@@ -3980,7 +3980,7 @@
         </p:blipFill>
         <p:spPr>
           <a:xfrm>
-            <a:off x="1309687" y="719642"/>
+            <a:off x="1776412" y="4110542"/>
             <a:ext cx="3259759" cy="2404558"/>
           </a:xfrm>
           <a:prstGeom prst="rect">
@@ -4010,7 +4010,7 @@
         </p:blipFill>
         <p:spPr>
           <a:xfrm>
-            <a:off x="5014913" y="734799"/>
+            <a:off x="5481638" y="4125699"/>
             <a:ext cx="3304186" cy="2404559"/>
           </a:xfrm>
           <a:prstGeom prst="rect">
@@ -4040,7 +4040,7 @@
         </p:blipFill>
         <p:spPr>
           <a:xfrm>
-            <a:off x="8662988" y="734800"/>
+            <a:off x="9129713" y="4125700"/>
             <a:ext cx="3182014" cy="2404558"/>
           </a:xfrm>
           <a:prstGeom prst="rect">
@@ -4070,7 +4070,7 @@
         </p:blipFill>
         <p:spPr>
           <a:xfrm>
-            <a:off x="1309686" y="3233737"/>
+            <a:off x="1436097" y="847545"/>
             <a:ext cx="3259760" cy="2404559"/>
           </a:xfrm>
           <a:prstGeom prst="rect">
@@ -4100,7 +4100,7 @@
         </p:blipFill>
         <p:spPr>
           <a:xfrm>
-            <a:off x="5014913" y="3233737"/>
+            <a:off x="5141324" y="847545"/>
             <a:ext cx="3304185" cy="2404558"/>
           </a:xfrm>
           <a:prstGeom prst="rect">
@@ -4130,7 +4130,7 @@
         </p:blipFill>
         <p:spPr>
           <a:xfrm>
-            <a:off x="8662988" y="3372263"/>
+            <a:off x="8789399" y="986071"/>
             <a:ext cx="3182014" cy="2442929"/>
           </a:xfrm>
           <a:prstGeom prst="rect">

</xml_diff>